<commit_message>
pauta I2 y calse floyd-warshall
</commit_message>
<xml_diff>
--- a/Clases/20. Floyd-Warshall.pptx
+++ b/Clases/20. Floyd-Warshall.pptx
@@ -5,34 +5,35 @@
     <p:sldMasterId id="2147484134" r:id="rId1"/>
   </p:sldMasterIdLst>
   <p:notesMasterIdLst>
-    <p:notesMasterId r:id="rId27"/>
+    <p:notesMasterId r:id="rId28"/>
   </p:notesMasterIdLst>
   <p:sldIdLst>
-    <p:sldId id="446" r:id="rId2"/>
-    <p:sldId id="449" r:id="rId3"/>
-    <p:sldId id="447" r:id="rId4"/>
-    <p:sldId id="448" r:id="rId5"/>
-    <p:sldId id="487" r:id="rId6"/>
-    <p:sldId id="488" r:id="rId7"/>
-    <p:sldId id="489" r:id="rId8"/>
-    <p:sldId id="490" r:id="rId9"/>
-    <p:sldId id="463" r:id="rId10"/>
-    <p:sldId id="468" r:id="rId11"/>
-    <p:sldId id="451" r:id="rId12"/>
-    <p:sldId id="471" r:id="rId13"/>
-    <p:sldId id="475" r:id="rId14"/>
-    <p:sldId id="476" r:id="rId15"/>
-    <p:sldId id="477" r:id="rId16"/>
-    <p:sldId id="478" r:id="rId17"/>
-    <p:sldId id="479" r:id="rId18"/>
-    <p:sldId id="480" r:id="rId19"/>
-    <p:sldId id="481" r:id="rId20"/>
-    <p:sldId id="482" r:id="rId21"/>
-    <p:sldId id="483" r:id="rId22"/>
-    <p:sldId id="484" r:id="rId23"/>
-    <p:sldId id="485" r:id="rId24"/>
-    <p:sldId id="486" r:id="rId25"/>
-    <p:sldId id="491" r:id="rId26"/>
+    <p:sldId id="492" r:id="rId2"/>
+    <p:sldId id="446" r:id="rId3"/>
+    <p:sldId id="449" r:id="rId4"/>
+    <p:sldId id="447" r:id="rId5"/>
+    <p:sldId id="448" r:id="rId6"/>
+    <p:sldId id="487" r:id="rId7"/>
+    <p:sldId id="488" r:id="rId8"/>
+    <p:sldId id="489" r:id="rId9"/>
+    <p:sldId id="490" r:id="rId10"/>
+    <p:sldId id="463" r:id="rId11"/>
+    <p:sldId id="468" r:id="rId12"/>
+    <p:sldId id="451" r:id="rId13"/>
+    <p:sldId id="471" r:id="rId14"/>
+    <p:sldId id="475" r:id="rId15"/>
+    <p:sldId id="476" r:id="rId16"/>
+    <p:sldId id="477" r:id="rId17"/>
+    <p:sldId id="478" r:id="rId18"/>
+    <p:sldId id="479" r:id="rId19"/>
+    <p:sldId id="480" r:id="rId20"/>
+    <p:sldId id="481" r:id="rId21"/>
+    <p:sldId id="482" r:id="rId22"/>
+    <p:sldId id="483" r:id="rId23"/>
+    <p:sldId id="484" r:id="rId24"/>
+    <p:sldId id="485" r:id="rId25"/>
+    <p:sldId id="486" r:id="rId26"/>
+    <p:sldId id="491" r:id="rId27"/>
   </p:sldIdLst>
   <p:sldSz cx="9144000" cy="6858000" type="screen4x3"/>
   <p:notesSz cx="6858000" cy="9144000"/>
@@ -568,7 +569,7 @@
           <a:p>
             <a:fld id="{ABF77DF9-CF23-43EF-B590-36783FE9A4C0}" type="slidenum">
               <a:rPr lang="es-CL" smtClean="0"/>
-              <a:t>1</a:t>
+              <a:t>2</a:t>
             </a:fld>
             <a:endParaRPr lang="es-CL"/>
           </a:p>
@@ -655,7 +656,7 @@
           <a:p>
             <a:fld id="{ABF77DF9-CF23-43EF-B590-36783FE9A4C0}" type="slidenum">
               <a:rPr lang="es-CL" smtClean="0"/>
-              <a:t>12</a:t>
+              <a:t>13</a:t>
             </a:fld>
             <a:endParaRPr lang="es-CL"/>
           </a:p>
@@ -739,7 +740,7 @@
           <a:p>
             <a:fld id="{ABF77DF9-CF23-43EF-B590-36783FE9A4C0}" type="slidenum">
               <a:rPr lang="es-CL" smtClean="0"/>
-              <a:t>13</a:t>
+              <a:t>14</a:t>
             </a:fld>
             <a:endParaRPr lang="es-CL"/>
           </a:p>
@@ -823,7 +824,7 @@
           <a:p>
             <a:fld id="{ABF77DF9-CF23-43EF-B590-36783FE9A4C0}" type="slidenum">
               <a:rPr lang="es-CL" smtClean="0"/>
-              <a:t>14</a:t>
+              <a:t>15</a:t>
             </a:fld>
             <a:endParaRPr lang="es-CL"/>
           </a:p>
@@ -907,7 +908,7 @@
           <a:p>
             <a:fld id="{ABF77DF9-CF23-43EF-B590-36783FE9A4C0}" type="slidenum">
               <a:rPr lang="es-CL" smtClean="0"/>
-              <a:t>15</a:t>
+              <a:t>16</a:t>
             </a:fld>
             <a:endParaRPr lang="es-CL"/>
           </a:p>
@@ -991,7 +992,7 @@
           <a:p>
             <a:fld id="{ABF77DF9-CF23-43EF-B590-36783FE9A4C0}" type="slidenum">
               <a:rPr lang="es-CL" smtClean="0"/>
-              <a:t>16</a:t>
+              <a:t>17</a:t>
             </a:fld>
             <a:endParaRPr lang="es-CL"/>
           </a:p>
@@ -1086,7 +1087,7 @@
           <a:p>
             <a:fld id="{ABF77DF9-CF23-43EF-B590-36783FE9A4C0}" type="slidenum">
               <a:rPr lang="es-CL" smtClean="0"/>
-              <a:t>17</a:t>
+              <a:t>18</a:t>
             </a:fld>
             <a:endParaRPr lang="es-CL"/>
           </a:p>
@@ -1235,7 +1236,7 @@
           <a:p>
             <a:fld id="{ABF77DF9-CF23-43EF-B590-36783FE9A4C0}" type="slidenum">
               <a:rPr lang="es-CL" smtClean="0"/>
-              <a:t>18</a:t>
+              <a:t>19</a:t>
             </a:fld>
             <a:endParaRPr lang="es-CL"/>
           </a:p>
@@ -1424,7 +1425,7 @@
           <a:p>
             <a:fld id="{ABF77DF9-CF23-43EF-B590-36783FE9A4C0}" type="slidenum">
               <a:rPr lang="es-CL" smtClean="0"/>
-              <a:t>19</a:t>
+              <a:t>20</a:t>
             </a:fld>
             <a:endParaRPr lang="es-CL"/>
           </a:p>
@@ -1613,7 +1614,7 @@
           <a:p>
             <a:fld id="{ABF77DF9-CF23-43EF-B590-36783FE9A4C0}" type="slidenum">
               <a:rPr lang="es-CL" smtClean="0"/>
-              <a:t>20</a:t>
+              <a:t>21</a:t>
             </a:fld>
             <a:endParaRPr lang="es-CL"/>
           </a:p>
@@ -1802,7 +1803,7 @@
           <a:p>
             <a:fld id="{ABF77DF9-CF23-43EF-B590-36783FE9A4C0}" type="slidenum">
               <a:rPr lang="es-CL" smtClean="0"/>
-              <a:t>21</a:t>
+              <a:t>22</a:t>
             </a:fld>
             <a:endParaRPr lang="es-CL"/>
           </a:p>
@@ -1886,7 +1887,7 @@
           <a:p>
             <a:fld id="{ABF77DF9-CF23-43EF-B590-36783FE9A4C0}" type="slidenum">
               <a:rPr lang="es-CL" smtClean="0"/>
-              <a:t>2</a:t>
+              <a:t>3</a:t>
             </a:fld>
             <a:endParaRPr lang="es-CL"/>
           </a:p>
@@ -2075,7 +2076,7 @@
           <a:p>
             <a:fld id="{ABF77DF9-CF23-43EF-B590-36783FE9A4C0}" type="slidenum">
               <a:rPr lang="es-CL" smtClean="0"/>
-              <a:t>22</a:t>
+              <a:t>23</a:t>
             </a:fld>
             <a:endParaRPr lang="es-CL"/>
           </a:p>
@@ -2264,7 +2265,7 @@
           <a:p>
             <a:fld id="{ABF77DF9-CF23-43EF-B590-36783FE9A4C0}" type="slidenum">
               <a:rPr lang="es-CL" smtClean="0"/>
-              <a:t>23</a:t>
+              <a:t>24</a:t>
             </a:fld>
             <a:endParaRPr lang="es-CL"/>
           </a:p>
@@ -2351,7 +2352,7 @@
           <a:p>
             <a:fld id="{ABF77DF9-CF23-43EF-B590-36783FE9A4C0}" type="slidenum">
               <a:rPr lang="es-CL" smtClean="0"/>
-              <a:t>24</a:t>
+              <a:t>25</a:t>
             </a:fld>
             <a:endParaRPr lang="es-CL"/>
           </a:p>
@@ -2521,7 +2522,7 @@
           <a:p>
             <a:fld id="{ABF77DF9-CF23-43EF-B590-36783FE9A4C0}" type="slidenum">
               <a:rPr lang="es-CL" smtClean="0"/>
-              <a:t>25</a:t>
+              <a:t>26</a:t>
             </a:fld>
             <a:endParaRPr lang="es-CL"/>
           </a:p>
@@ -2608,7 +2609,7 @@
           <a:p>
             <a:fld id="{ABF77DF9-CF23-43EF-B590-36783FE9A4C0}" type="slidenum">
               <a:rPr lang="es-CL" smtClean="0"/>
-              <a:t>3</a:t>
+              <a:t>4</a:t>
             </a:fld>
             <a:endParaRPr lang="es-CL"/>
           </a:p>
@@ -3084,7 +3085,7 @@
           <a:p>
             <a:fld id="{ABF77DF9-CF23-43EF-B590-36783FE9A4C0}" type="slidenum">
               <a:rPr lang="es-CL" smtClean="0"/>
-              <a:t>4</a:t>
+              <a:t>5</a:t>
             </a:fld>
             <a:endParaRPr lang="es-CL"/>
           </a:p>
@@ -3168,7 +3169,7 @@
           <a:p>
             <a:fld id="{ABF77DF9-CF23-43EF-B590-36783FE9A4C0}" type="slidenum">
               <a:rPr lang="es-CL" smtClean="0"/>
-              <a:t>5</a:t>
+              <a:t>6</a:t>
             </a:fld>
             <a:endParaRPr lang="es-CL"/>
           </a:p>
@@ -3255,7 +3256,7 @@
           <a:p>
             <a:fld id="{ABF77DF9-CF23-43EF-B590-36783FE9A4C0}" type="slidenum">
               <a:rPr lang="es-CL" smtClean="0"/>
-              <a:t>6</a:t>
+              <a:t>7</a:t>
             </a:fld>
             <a:endParaRPr lang="es-CL"/>
           </a:p>
@@ -3641,7 +3642,7 @@
           <a:p>
             <a:fld id="{ABF77DF9-CF23-43EF-B590-36783FE9A4C0}" type="slidenum">
               <a:rPr lang="es-CL" smtClean="0"/>
-              <a:t>9</a:t>
+              <a:t>10</a:t>
             </a:fld>
             <a:endParaRPr lang="es-CL"/>
           </a:p>
@@ -3728,7 +3729,7 @@
           <a:p>
             <a:fld id="{ABF77DF9-CF23-43EF-B590-36783FE9A4C0}" type="slidenum">
               <a:rPr lang="es-CL" smtClean="0"/>
-              <a:t>10</a:t>
+              <a:t>11</a:t>
             </a:fld>
             <a:endParaRPr lang="es-CL"/>
           </a:p>
@@ -3871,7 +3872,7 @@
           <a:p>
             <a:fld id="{ABF77DF9-CF23-43EF-B590-36783FE9A4C0}" type="slidenum">
               <a:rPr lang="es-CL" smtClean="0"/>
-              <a:t>11</a:t>
+              <a:t>12</a:t>
             </a:fld>
             <a:endParaRPr lang="es-CL"/>
           </a:p>
@@ -5686,7 +5687,118 @@
           <p:cNvPr id="2" name="Title 1">
             <a:extLst>
               <a:ext uri="{FF2B5EF4-FFF2-40B4-BE49-F238E27FC236}">
-                <a16:creationId xmlns:a16="http://schemas.microsoft.com/office/drawing/2014/main" id="{58854048-F220-4FBA-87F4-34AD25A66752}"/>
+                <a16:creationId xmlns:a16="http://schemas.microsoft.com/office/drawing/2014/main" id="{BEB730E1-92F6-4381-89BE-AE4C048BF274}"/>
+              </a:ext>
+            </a:extLst>
+          </p:cNvPr>
+          <p:cNvSpPr>
+            <a:spLocks noGrp="1"/>
+          </p:cNvSpPr>
+          <p:nvPr>
+            <p:ph type="title"/>
+          </p:nvPr>
+        </p:nvSpPr>
+        <p:spPr/>
+        <p:txBody>
+          <a:bodyPr>
+            <a:normAutofit fontScale="90000"/>
+          </a:bodyPr>
+          <a:lstStyle/>
+          <a:p>
+            <a:r>
+              <a:rPr lang="es-CL" dirty="0"/>
+              <a:t>Recapitulando sobre rutas más cortas</a:t>
+            </a:r>
+          </a:p>
+        </p:txBody>
+      </p:sp>
+      <p:sp>
+        <p:nvSpPr>
+          <p:cNvPr id="3" name="Content Placeholder 2">
+            <a:extLst>
+              <a:ext uri="{FF2B5EF4-FFF2-40B4-BE49-F238E27FC236}">
+                <a16:creationId xmlns:a16="http://schemas.microsoft.com/office/drawing/2014/main" id="{C0284E80-FDD9-4F44-96A2-62180D470E59}"/>
+              </a:ext>
+            </a:extLst>
+          </p:cNvPr>
+          <p:cNvSpPr>
+            <a:spLocks noGrp="1"/>
+          </p:cNvSpPr>
+          <p:nvPr>
+            <p:ph idx="1"/>
+          </p:nvPr>
+        </p:nvSpPr>
+        <p:spPr/>
+        <p:txBody>
+          <a:bodyPr>
+            <a:normAutofit fontScale="92500"/>
+          </a:bodyPr>
+          <a:lstStyle/>
+          <a:p>
+            <a:endParaRPr lang="es-CL" dirty="0"/>
+          </a:p>
+          <a:p>
+            <a:r>
+              <a:rPr lang="es-CL" dirty="0"/>
+              <a:t>Ya resolvimos rutas más cortas en grafos dirigidos con costos</a:t>
+            </a:r>
+          </a:p>
+          <a:p>
+            <a:endParaRPr lang="es-CL" dirty="0"/>
+          </a:p>
+          <a:p>
+            <a:r>
+              <a:rPr lang="es-CL" dirty="0"/>
+              <a:t>No hemos hablado de costos negativos</a:t>
+            </a:r>
+          </a:p>
+          <a:p>
+            <a:endParaRPr lang="es-CL" dirty="0"/>
+          </a:p>
+          <a:p>
+            <a:r>
+              <a:rPr lang="es-CL" dirty="0"/>
+              <a:t>Solo hemos buscado rutas más cortas desde un nodo al resto</a:t>
+            </a:r>
+          </a:p>
+        </p:txBody>
+      </p:sp>
+    </p:spTree>
+    <p:extLst>
+      <p:ext uri="{BB962C8B-B14F-4D97-AF65-F5344CB8AC3E}">
+        <p14:creationId xmlns:p14="http://schemas.microsoft.com/office/powerpoint/2010/main" val="1676106382"/>
+      </p:ext>
+    </p:extLst>
+  </p:cSld>
+  <p:clrMapOvr>
+    <a:masterClrMapping/>
+  </p:clrMapOvr>
+</p:sld>
+</file>
+
+<file path=ppt/slides/slide10.xml><?xml version="1.0" encoding="utf-8"?>
+<p:sld xmlns:a="http://schemas.openxmlformats.org/drawingml/2006/main" xmlns:r="http://schemas.openxmlformats.org/officeDocument/2006/relationships" xmlns:p="http://schemas.openxmlformats.org/presentationml/2006/main">
+  <p:cSld>
+    <p:spTree>
+      <p:nvGrpSpPr>
+        <p:cNvPr id="1" name=""/>
+        <p:cNvGrpSpPr/>
+        <p:nvPr/>
+      </p:nvGrpSpPr>
+      <p:grpSpPr>
+        <a:xfrm>
+          <a:off x="0" y="0"/>
+          <a:ext cx="0" cy="0"/>
+          <a:chOff x="0" y="0"/>
+          <a:chExt cx="0" cy="0"/>
+        </a:xfrm>
+      </p:grpSpPr>
+      <p:sp>
+        <p:nvSpPr>
+          <p:cNvPr id="4" name="Title 3">
+            <a:extLst>
+              <a:ext uri="{FF2B5EF4-FFF2-40B4-BE49-F238E27FC236}">
+                <a16:creationId xmlns:a16="http://schemas.microsoft.com/office/drawing/2014/main" id="{31DFC968-27E4-4A44-99D9-B7F0DED4A384}"/>
               </a:ext>
             </a:extLst>
           </p:cNvPr>
@@ -5703,10 +5815,9 @@
           <a:lstStyle/>
           <a:p>
             <a:r>
-              <a:rPr lang="es-CL"/>
-              <a:t>La aerolínea</a:t>
+              <a:rPr lang="es-CL" dirty="0"/>
+              <a:t>Combinaciones de input</a:t>
             </a:r>
-            <a:endParaRPr lang="es-CL" dirty="0"/>
           </a:p>
         </p:txBody>
       </p:sp>
@@ -5717,7 +5828,7 @@
               <p:cNvPr id="3" name="Content Placeholder 2">
                 <a:extLst>
                   <a:ext uri="{FF2B5EF4-FFF2-40B4-BE49-F238E27FC236}">
-                    <a16:creationId xmlns:a16="http://schemas.microsoft.com/office/drawing/2014/main" id="{B4647918-AB7B-4CE6-8D12-CF80C0FB22FE}"/>
+                    <a16:creationId xmlns:a16="http://schemas.microsoft.com/office/drawing/2014/main" id="{AA36ED36-EA70-40CE-B266-1CBAB93389D9}"/>
                   </a:ext>
                 </a:extLst>
               </p:cNvPr>
@@ -5730,126 +5841,85 @@
             </p:nvSpPr>
             <p:spPr/>
             <p:txBody>
-              <a:bodyPr>
-                <a:normAutofit fontScale="77500" lnSpcReduction="20000"/>
+              <a:bodyPr anchor="ctr">
+                <a:normAutofit/>
               </a:bodyPr>
               <a:lstStyle/>
               <a:p>
-                <a:pPr>
-                  <a:lnSpc>
-                    <a:spcPct val="120000"/>
-                  </a:lnSpc>
-                  <a:buFont typeface="Arial" panose="020B0604020202020204" pitchFamily="34" charset="0"/>
-                  <a:buChar char="•"/>
+                <a:pPr marL="0" indent="0">
+                  <a:buNone/>
                 </a:pPr>
                 <a:r>
-                  <a:rPr lang="es-CL" dirty="0"/>
-                  <a:t> Queremos programar la página de ventas de una aerolínea</a:t>
-                </a:r>
-              </a:p>
-              <a:p>
-                <a:pPr>
-                  <a:lnSpc>
-                    <a:spcPct val="120000"/>
-                  </a:lnSpc>
-                  <a:buFont typeface="Arial" panose="020B0604020202020204" pitchFamily="34" charset="0"/>
-                  <a:buChar char="•"/>
-                </a:pPr>
-                <a:r>
-                  <a:rPr lang="es-CL" dirty="0"/>
-                  <a:t> Tienes la lista de vuelos: origen, destino y costo</a:t>
-                </a:r>
-              </a:p>
-              <a:p>
-                <a:pPr>
-                  <a:lnSpc>
-                    <a:spcPct val="120000"/>
-                  </a:lnSpc>
-                  <a:buFont typeface="Arial" panose="020B0604020202020204" pitchFamily="34" charset="0"/>
-                  <a:buChar char="•"/>
-                </a:pPr>
-                <a:r>
-                  <a:rPr lang="es-CL" dirty="0"/>
-                  <a:t> La lista de vuelos no cambia en todo el año</a:t>
-                </a:r>
-              </a:p>
-              <a:p>
-                <a:pPr>
-                  <a:lnSpc>
-                    <a:spcPct val="120000"/>
-                  </a:lnSpc>
-                  <a:buFont typeface="Arial" panose="020B0604020202020204" pitchFamily="34" charset="0"/>
-                  <a:buChar char="•"/>
-                </a:pPr>
-                <a:r>
-                  <a:rPr lang="es-CL" dirty="0"/>
-                  <a:t> Es posible hacer más de un vuelo para llegar de </a:t>
+                  <a:rPr lang="es-CL" sz="2600" dirty="0"/>
+                  <a:t>¿Cuántas posibles combinaciones </a:t>
                 </a:r>
                 <a14:m>
                   <m:oMath xmlns:m="http://schemas.openxmlformats.org/officeDocument/2006/math">
                     <m:r>
-                      <a:rPr lang="es-CL" b="0" i="1" smtClean="0">
+                      <a:rPr lang="es-CL" sz="2600" b="0" i="1" smtClean="0">
                         <a:latin typeface="Cambria Math" panose="02040503050406030204" pitchFamily="18" charset="0"/>
                       </a:rPr>
-                      <m:t>𝐴</m:t>
+                      <m:t>𝑢</m:t>
+                    </m:r>
+                    <m:r>
+                      <a:rPr lang="es-CL" sz="2600" b="0" i="1" smtClean="0">
+                        <a:latin typeface="Cambria Math" panose="02040503050406030204" pitchFamily="18" charset="0"/>
+                      </a:rPr>
+                      <m:t>,</m:t>
+                    </m:r>
+                    <m:r>
+                      <a:rPr lang="es-CL" sz="2600" b="0" i="1" smtClean="0">
+                        <a:latin typeface="Cambria Math" panose="02040503050406030204" pitchFamily="18" charset="0"/>
+                      </a:rPr>
+                      <m:t>𝑣</m:t>
+                    </m:r>
+                    <m:r>
+                      <a:rPr lang="es-CL" sz="2600" b="0" i="1" smtClean="0">
+                        <a:latin typeface="Cambria Math" panose="02040503050406030204" pitchFamily="18" charset="0"/>
+                      </a:rPr>
+                      <m:t>,</m:t>
+                    </m:r>
+                    <m:r>
+                      <a:rPr lang="es-CL" sz="2600" b="0" i="1" smtClean="0">
+                        <a:latin typeface="Cambria Math" panose="02040503050406030204" pitchFamily="18" charset="0"/>
+                      </a:rPr>
+                      <m:t>𝑋</m:t>
                     </m:r>
                   </m:oMath>
                 </a14:m>
                 <a:r>
-                  <a:rPr lang="es-CL" dirty="0"/>
-                  <a:t> a </a:t>
-                </a:r>
-                <a14:m>
-                  <m:oMath xmlns:m="http://schemas.openxmlformats.org/officeDocument/2006/math">
-                    <m:r>
-                      <a:rPr lang="es-CL" b="0" i="1" smtClean="0">
-                        <a:latin typeface="Cambria Math" panose="02040503050406030204" pitchFamily="18" charset="0"/>
-                      </a:rPr>
-                      <m:t>𝐵</m:t>
-                    </m:r>
-                  </m:oMath>
-                </a14:m>
-                <a:endParaRPr lang="es-CL" dirty="0"/>
-              </a:p>
-              <a:p>
-                <a:pPr>
-                  <a:lnSpc>
-                    <a:spcPct val="120000"/>
-                  </a:lnSpc>
-                  <a:buFont typeface="Arial" panose="020B0604020202020204" pitchFamily="34" charset="0"/>
-                  <a:buChar char="•"/>
-                </a:pPr>
-                <a:r>
-                  <a:rPr lang="es-CL" dirty="0"/>
-                  <a:t> Queremos minimizar el costo total del viaje</a:t>
-                </a:r>
-              </a:p>
-              <a:p>
-                <a:pPr>
-                  <a:lnSpc>
-                    <a:spcPct val="120000"/>
-                  </a:lnSpc>
-                  <a:buFont typeface="Arial" panose="020B0604020202020204" pitchFamily="34" charset="0"/>
-                  <a:buChar char="•"/>
-                </a:pPr>
-                <a:r>
-                  <a:rPr lang="es-CL" dirty="0"/>
-                  <a:t> Si la página tarda en responder, el usuario buscará otra aerolínea</a:t>
+                  <a:rPr lang="es-CL" sz="2600" dirty="0"/>
+                  <a:t> existen?</a:t>
                 </a:r>
               </a:p>
               <a:p>
                 <a:pPr marL="0" indent="0">
                   <a:buNone/>
                 </a:pPr>
-                <a:endParaRPr lang="es-CL" dirty="0"/>
+                <a:endParaRPr lang="es-CL" sz="2600" dirty="0"/>
               </a:p>
               <a:p>
                 <a:pPr marL="0" indent="0">
                   <a:buNone/>
                 </a:pPr>
                 <a:r>
-                  <a:rPr lang="es-CL" dirty="0"/>
-                  <a:t>¿Qué deberíamos hacer?</a:t>
+                  <a:rPr lang="es-CL" sz="2600" dirty="0"/>
+                  <a:t>¿Tiene sentido generarlas todas?</a:t>
+                </a:r>
+              </a:p>
+              <a:p>
+                <a:pPr marL="0" indent="0">
+                  <a:buNone/>
+                </a:pPr>
+                <a:endParaRPr lang="es-CL" sz="2600" dirty="0"/>
+              </a:p>
+              <a:p>
+                <a:pPr marL="0" indent="0">
+                  <a:buNone/>
+                </a:pPr>
+                <a:r>
+                  <a:rPr lang="es-CL" sz="2600" dirty="0"/>
+                  <a:t>¿Qué podemos hacer para acotar las que puede ver la función?</a:t>
                 </a:r>
               </a:p>
             </p:txBody>
@@ -5861,7 +5931,7 @@
               <p:cNvPr id="3" name="Content Placeholder 2">
                 <a:extLst>
                   <a:ext uri="{FF2B5EF4-FFF2-40B4-BE49-F238E27FC236}">
-                    <a16:creationId xmlns:a16="http://schemas.microsoft.com/office/drawing/2014/main" id="{B4647918-AB7B-4CE6-8D12-CF80C0FB22FE}"/>
+                    <a16:creationId xmlns:a16="http://schemas.microsoft.com/office/drawing/2014/main" id="{AA36ED36-EA70-40CE-B266-1CBAB93389D9}"/>
                   </a:ext>
                 </a:extLst>
               </p:cNvPr>
@@ -5876,7 +5946,7 @@
               <a:blipFill>
                 <a:blip r:embed="rId3"/>
                 <a:stretch>
-                  <a:fillRect l="-917" t="-856" b="-856"/>
+                  <a:fillRect l="-1269" r="-987"/>
                 </a:stretch>
               </a:blipFill>
             </p:spPr>
@@ -5898,7 +5968,7 @@
     </p:spTree>
     <p:extLst>
       <p:ext uri="{BB962C8B-B14F-4D97-AF65-F5344CB8AC3E}">
-        <p14:creationId xmlns:p14="http://schemas.microsoft.com/office/powerpoint/2010/main" val="1997209740"/>
+        <p14:creationId xmlns:p14="http://schemas.microsoft.com/office/powerpoint/2010/main" val="685510549"/>
       </p:ext>
     </p:extLst>
   </p:cSld>
@@ -5908,7 +5978,7 @@
 </p:sld>
 </file>
 
-<file path=ppt/slides/slide10.xml><?xml version="1.0" encoding="utf-8"?>
+<file path=ppt/slides/slide11.xml><?xml version="1.0" encoding="utf-8"?>
 <p:sld xmlns:a="http://schemas.openxmlformats.org/drawingml/2006/main" xmlns:r="http://schemas.openxmlformats.org/officeDocument/2006/relationships" xmlns:p="http://schemas.openxmlformats.org/presentationml/2006/main">
   <p:cSld>
     <p:spTree>
@@ -5953,8 +6023,8 @@
           </a:p>
         </p:txBody>
       </p:sp>
-      <mc:AlternateContent xmlns:mc="http://schemas.openxmlformats.org/markup-compatibility/2006">
-        <mc:Choice xmlns:a14="http://schemas.microsoft.com/office/drawing/2010/main" Requires="a14">
+      <mc:AlternateContent xmlns:mc="http://schemas.openxmlformats.org/markup-compatibility/2006" xmlns:a14="http://schemas.microsoft.com/office/drawing/2010/main">
+        <mc:Choice Requires="a14">
           <p:sp>
             <p:nvSpPr>
               <p:cNvPr id="3" name="Content Placeholder 2">
@@ -6166,7 +6236,7 @@
             </p:txBody>
           </p:sp>
         </mc:Choice>
-        <mc:Fallback>
+        <mc:Fallback xmlns="">
           <p:sp>
             <p:nvSpPr>
               <p:cNvPr id="3" name="Content Placeholder 2">
@@ -6223,7 +6293,7 @@
 </p:sld>
 </file>
 
-<file path=ppt/slides/slide11.xml><?xml version="1.0" encoding="utf-8"?>
+<file path=ppt/slides/slide12.xml><?xml version="1.0" encoding="utf-8"?>
 <p:sld xmlns:a="http://schemas.openxmlformats.org/drawingml/2006/main" xmlns:r="http://schemas.openxmlformats.org/officeDocument/2006/relationships" xmlns:p="http://schemas.openxmlformats.org/presentationml/2006/main">
   <p:cSld>
     <p:spTree>
@@ -6276,8 +6346,8 @@
           </a:p>
         </p:txBody>
       </p:sp>
-      <mc:AlternateContent xmlns:mc="http://schemas.openxmlformats.org/markup-compatibility/2006">
-        <mc:Choice xmlns:a14="http://schemas.microsoft.com/office/drawing/2010/main" Requires="a14">
+      <mc:AlternateContent xmlns:mc="http://schemas.openxmlformats.org/markup-compatibility/2006" xmlns:a14="http://schemas.microsoft.com/office/drawing/2010/main">
+        <mc:Choice Requires="a14">
           <p:sp>
             <p:nvSpPr>
               <p:cNvPr id="3" name="Content Placeholder 2">
@@ -6366,7 +6436,7 @@
             </p:txBody>
           </p:sp>
         </mc:Choice>
-        <mc:Fallback>
+        <mc:Fallback xmlns="">
           <p:sp>
             <p:nvSpPr>
               <p:cNvPr id="3" name="Content Placeholder 2">
@@ -6419,7 +6489,7 @@
 </p:sld>
 </file>
 
-<file path=ppt/slides/slide12.xml><?xml version="1.0" encoding="utf-8"?>
+<file path=ppt/slides/slide13.xml><?xml version="1.0" encoding="utf-8"?>
 <p:sld xmlns:a="http://schemas.openxmlformats.org/drawingml/2006/main" xmlns:r="http://schemas.openxmlformats.org/officeDocument/2006/relationships" xmlns:p="http://schemas.openxmlformats.org/presentationml/2006/main">
   <p:cSld>
     <p:spTree>
@@ -6464,8 +6534,8 @@
           </a:p>
         </p:txBody>
       </p:sp>
-      <mc:AlternateContent xmlns:mc="http://schemas.openxmlformats.org/markup-compatibility/2006">
-        <mc:Choice xmlns:a14="http://schemas.microsoft.com/office/drawing/2010/main" Requires="a14">
+      <mc:AlternateContent xmlns:mc="http://schemas.openxmlformats.org/markup-compatibility/2006" xmlns:a14="http://schemas.microsoft.com/office/drawing/2010/main">
+        <mc:Choice Requires="a14">
           <p:sp>
             <p:nvSpPr>
               <p:cNvPr id="3" name="Content Placeholder 2">
@@ -6682,13 +6752,7 @@
                         <a:rPr lang="es-CL" b="0" i="1" smtClean="0">
                           <a:latin typeface="Cambria Math" panose="02040503050406030204" pitchFamily="18" charset="0"/>
                         </a:rPr>
-                        <m:t>)</m:t>
-                      </m:r>
-                      <m:r>
-                        <a:rPr lang="es-CL" b="0" i="1" smtClean="0">
-                          <a:latin typeface="Cambria Math" panose="02040503050406030204" pitchFamily="18" charset="0"/>
-                        </a:rPr>
-                        <m:t>=</m:t>
+                        <m:t>)=</m:t>
                       </m:r>
                       <m:d>
                         <m:dPr>
@@ -6933,13 +6997,7 @@
                                             <a:rPr lang="es-CL" b="0" i="1" smtClean="0">
                                               <a:latin typeface="Cambria Math" panose="02040503050406030204" pitchFamily="18" charset="0"/>
                                             </a:rPr>
-                                            <m:t>)</m:t>
-                                          </m:r>
-                                          <m:r>
-                                            <a:rPr lang="es-CL" b="0" i="1" smtClean="0">
-                                              <a:latin typeface="Cambria Math" panose="02040503050406030204" pitchFamily="18" charset="0"/>
-                                            </a:rPr>
-                                            <m:t>+</m:t>
+                                            <m:t>)+</m:t>
                                           </m:r>
                                           <m:r>
                                             <a:rPr lang="es-CL" b="0" i="1" smtClean="0">
@@ -7032,7 +7090,7 @@
             </p:txBody>
           </p:sp>
         </mc:Choice>
-        <mc:Fallback>
+        <mc:Fallback xmlns="">
           <p:sp>
             <p:nvSpPr>
               <p:cNvPr id="3" name="Content Placeholder 2">
@@ -7072,8 +7130,8 @@
           </p:sp>
         </mc:Fallback>
       </mc:AlternateContent>
-      <mc:AlternateContent xmlns:mc="http://schemas.openxmlformats.org/markup-compatibility/2006">
-        <mc:Choice xmlns:a14="http://schemas.microsoft.com/office/drawing/2010/main" Requires="a14">
+      <mc:AlternateContent xmlns:mc="http://schemas.openxmlformats.org/markup-compatibility/2006" xmlns:a14="http://schemas.microsoft.com/office/drawing/2010/main">
+        <mc:Choice Requires="a14">
           <p:sp>
             <p:nvSpPr>
               <p:cNvPr id="4" name="TextBox 3">
@@ -7259,7 +7317,7 @@
             </p:txBody>
           </p:sp>
         </mc:Choice>
-        <mc:Fallback>
+        <mc:Fallback xmlns="">
           <p:sp>
             <p:nvSpPr>
               <p:cNvPr id="4" name="TextBox 3">
@@ -7317,7 +7375,7 @@
 </p:sld>
 </file>
 
-<file path=ppt/slides/slide13.xml><?xml version="1.0" encoding="utf-8"?>
+<file path=ppt/slides/slide14.xml><?xml version="1.0" encoding="utf-8"?>
 <p:sld xmlns:a="http://schemas.openxmlformats.org/drawingml/2006/main" xmlns:r="http://schemas.openxmlformats.org/officeDocument/2006/relationships" xmlns:p="http://schemas.openxmlformats.org/presentationml/2006/main">
   <p:cSld>
     <p:spTree>
@@ -7334,8 +7392,8 @@
           <a:chExt cx="0" cy="0"/>
         </a:xfrm>
       </p:grpSpPr>
-      <mc:AlternateContent xmlns:mc="http://schemas.openxmlformats.org/markup-compatibility/2006">
-        <mc:Choice xmlns:a14="http://schemas.microsoft.com/office/drawing/2010/main" Requires="a14">
+      <mc:AlternateContent xmlns:mc="http://schemas.openxmlformats.org/markup-compatibility/2006" xmlns:a14="http://schemas.microsoft.com/office/drawing/2010/main">
+        <mc:Choice Requires="a14">
           <p:sp>
             <p:nvSpPr>
               <p:cNvPr id="2" name="Content Placeholder 1">
@@ -8341,7 +8399,7 @@
             </p:txBody>
           </p:sp>
         </mc:Choice>
-        <mc:Fallback>
+        <mc:Fallback xmlns="">
           <p:sp>
             <p:nvSpPr>
               <p:cNvPr id="2" name="Content Placeholder 1">
@@ -8398,7 +8456,7 @@
 </p:sld>
 </file>
 
-<file path=ppt/slides/slide14.xml><?xml version="1.0" encoding="utf-8"?>
+<file path=ppt/slides/slide15.xml><?xml version="1.0" encoding="utf-8"?>
 <p:sld xmlns:a="http://schemas.openxmlformats.org/drawingml/2006/main" xmlns:r="http://schemas.openxmlformats.org/officeDocument/2006/relationships" xmlns:p="http://schemas.openxmlformats.org/presentationml/2006/main">
   <p:cSld>
     <p:spTree>
@@ -8525,7 +8583,7 @@
 </p:sld>
 </file>
 
-<file path=ppt/slides/slide15.xml><?xml version="1.0" encoding="utf-8"?>
+<file path=ppt/slides/slide16.xml><?xml version="1.0" encoding="utf-8"?>
 <p:sld xmlns:a="http://schemas.openxmlformats.org/drawingml/2006/main" xmlns:r="http://schemas.openxmlformats.org/officeDocument/2006/relationships" xmlns:p="http://schemas.openxmlformats.org/presentationml/2006/main">
   <p:cSld>
     <p:spTree>
@@ -8887,7 +8945,7 @@
 </p:sld>
 </file>
 
-<file path=ppt/slides/slide16.xml><?xml version="1.0" encoding="utf-8"?>
+<file path=ppt/slides/slide17.xml><?xml version="1.0" encoding="utf-8"?>
 <p:sld xmlns:a="http://schemas.openxmlformats.org/drawingml/2006/main" xmlns:r="http://schemas.openxmlformats.org/officeDocument/2006/relationships" xmlns:p="http://schemas.openxmlformats.org/presentationml/2006/main">
   <p:cSld>
     <p:spTree>
@@ -9836,7 +9894,7 @@
 </p:sld>
 </file>
 
-<file path=ppt/slides/slide17.xml><?xml version="1.0" encoding="utf-8"?>
+<file path=ppt/slides/slide18.xml><?xml version="1.0" encoding="utf-8"?>
 <p:sld xmlns:a="http://schemas.openxmlformats.org/drawingml/2006/main" xmlns:r="http://schemas.openxmlformats.org/officeDocument/2006/relationships" xmlns:p="http://schemas.openxmlformats.org/presentationml/2006/main">
   <p:cSld>
     <p:spTree>
@@ -9954,7 +10012,7 @@
 </p:sld>
 </file>
 
-<file path=ppt/slides/slide18.xml><?xml version="1.0" encoding="utf-8"?>
+<file path=ppt/slides/slide19.xml><?xml version="1.0" encoding="utf-8"?>
 <p:sld xmlns:a="http://schemas.openxmlformats.org/drawingml/2006/main" xmlns:r="http://schemas.openxmlformats.org/officeDocument/2006/relationships" xmlns:p="http://schemas.openxmlformats.org/presentationml/2006/main">
   <p:cSld>
     <p:spTree>
@@ -11840,7 +11898,251 @@
 </p:sld>
 </file>
 
-<file path=ppt/slides/slide19.xml><?xml version="1.0" encoding="utf-8"?>
+<file path=ppt/slides/slide2.xml><?xml version="1.0" encoding="utf-8"?>
+<p:sld xmlns:a="http://schemas.openxmlformats.org/drawingml/2006/main" xmlns:r="http://schemas.openxmlformats.org/officeDocument/2006/relationships" xmlns:p="http://schemas.openxmlformats.org/presentationml/2006/main">
+  <p:cSld>
+    <p:spTree>
+      <p:nvGrpSpPr>
+        <p:cNvPr id="1" name=""/>
+        <p:cNvGrpSpPr/>
+        <p:nvPr/>
+      </p:nvGrpSpPr>
+      <p:grpSpPr>
+        <a:xfrm>
+          <a:off x="0" y="0"/>
+          <a:ext cx="0" cy="0"/>
+          <a:chOff x="0" y="0"/>
+          <a:chExt cx="0" cy="0"/>
+        </a:xfrm>
+      </p:grpSpPr>
+      <p:sp>
+        <p:nvSpPr>
+          <p:cNvPr id="2" name="Title 1">
+            <a:extLst>
+              <a:ext uri="{FF2B5EF4-FFF2-40B4-BE49-F238E27FC236}">
+                <a16:creationId xmlns:a16="http://schemas.microsoft.com/office/drawing/2014/main" id="{58854048-F220-4FBA-87F4-34AD25A66752}"/>
+              </a:ext>
+            </a:extLst>
+          </p:cNvPr>
+          <p:cNvSpPr>
+            <a:spLocks noGrp="1"/>
+          </p:cNvSpPr>
+          <p:nvPr>
+            <p:ph type="title"/>
+          </p:nvPr>
+        </p:nvSpPr>
+        <p:spPr/>
+        <p:txBody>
+          <a:bodyPr/>
+          <a:lstStyle/>
+          <a:p>
+            <a:r>
+              <a:rPr lang="es-CL"/>
+              <a:t>La aerolínea</a:t>
+            </a:r>
+            <a:endParaRPr lang="es-CL" dirty="0"/>
+          </a:p>
+        </p:txBody>
+      </p:sp>
+      <mc:AlternateContent xmlns:mc="http://schemas.openxmlformats.org/markup-compatibility/2006" xmlns:a14="http://schemas.microsoft.com/office/drawing/2010/main">
+        <mc:Choice Requires="a14">
+          <p:sp>
+            <p:nvSpPr>
+              <p:cNvPr id="3" name="Content Placeholder 2">
+                <a:extLst>
+                  <a:ext uri="{FF2B5EF4-FFF2-40B4-BE49-F238E27FC236}">
+                    <a16:creationId xmlns:a16="http://schemas.microsoft.com/office/drawing/2014/main" id="{B4647918-AB7B-4CE6-8D12-CF80C0FB22FE}"/>
+                  </a:ext>
+                </a:extLst>
+              </p:cNvPr>
+              <p:cNvSpPr>
+                <a:spLocks noGrp="1"/>
+              </p:cNvSpPr>
+              <p:nvPr>
+                <p:ph idx="1"/>
+              </p:nvPr>
+            </p:nvSpPr>
+            <p:spPr/>
+            <p:txBody>
+              <a:bodyPr>
+                <a:normAutofit fontScale="77500" lnSpcReduction="20000"/>
+              </a:bodyPr>
+              <a:lstStyle/>
+              <a:p>
+                <a:pPr>
+                  <a:lnSpc>
+                    <a:spcPct val="120000"/>
+                  </a:lnSpc>
+                  <a:buFont typeface="Arial" panose="020B0604020202020204" pitchFamily="34" charset="0"/>
+                  <a:buChar char="•"/>
+                </a:pPr>
+                <a:r>
+                  <a:rPr lang="es-CL" dirty="0"/>
+                  <a:t> Queremos programar la página de ventas de una aerolínea</a:t>
+                </a:r>
+              </a:p>
+              <a:p>
+                <a:pPr>
+                  <a:lnSpc>
+                    <a:spcPct val="120000"/>
+                  </a:lnSpc>
+                  <a:buFont typeface="Arial" panose="020B0604020202020204" pitchFamily="34" charset="0"/>
+                  <a:buChar char="•"/>
+                </a:pPr>
+                <a:r>
+                  <a:rPr lang="es-CL" dirty="0"/>
+                  <a:t> Tienes la lista de vuelos: origen, destino y costo</a:t>
+                </a:r>
+              </a:p>
+              <a:p>
+                <a:pPr>
+                  <a:lnSpc>
+                    <a:spcPct val="120000"/>
+                  </a:lnSpc>
+                  <a:buFont typeface="Arial" panose="020B0604020202020204" pitchFamily="34" charset="0"/>
+                  <a:buChar char="•"/>
+                </a:pPr>
+                <a:r>
+                  <a:rPr lang="es-CL" dirty="0"/>
+                  <a:t> La lista de vuelos no cambia en todo el año</a:t>
+                </a:r>
+              </a:p>
+              <a:p>
+                <a:pPr>
+                  <a:lnSpc>
+                    <a:spcPct val="120000"/>
+                  </a:lnSpc>
+                  <a:buFont typeface="Arial" panose="020B0604020202020204" pitchFamily="34" charset="0"/>
+                  <a:buChar char="•"/>
+                </a:pPr>
+                <a:r>
+                  <a:rPr lang="es-CL" dirty="0"/>
+                  <a:t> Es posible hacer más de un vuelo para llegar de </a:t>
+                </a:r>
+                <a14:m>
+                  <m:oMath xmlns:m="http://schemas.openxmlformats.org/officeDocument/2006/math">
+                    <m:r>
+                      <a:rPr lang="es-CL" b="0" i="1" smtClean="0">
+                        <a:latin typeface="Cambria Math" panose="02040503050406030204" pitchFamily="18" charset="0"/>
+                      </a:rPr>
+                      <m:t>𝐴</m:t>
+                    </m:r>
+                  </m:oMath>
+                </a14:m>
+                <a:r>
+                  <a:rPr lang="es-CL" dirty="0"/>
+                  <a:t> a </a:t>
+                </a:r>
+                <a14:m>
+                  <m:oMath xmlns:m="http://schemas.openxmlformats.org/officeDocument/2006/math">
+                    <m:r>
+                      <a:rPr lang="es-CL" b="0" i="1" smtClean="0">
+                        <a:latin typeface="Cambria Math" panose="02040503050406030204" pitchFamily="18" charset="0"/>
+                      </a:rPr>
+                      <m:t>𝐵</m:t>
+                    </m:r>
+                  </m:oMath>
+                </a14:m>
+                <a:endParaRPr lang="es-CL" dirty="0"/>
+              </a:p>
+              <a:p>
+                <a:pPr>
+                  <a:lnSpc>
+                    <a:spcPct val="120000"/>
+                  </a:lnSpc>
+                  <a:buFont typeface="Arial" panose="020B0604020202020204" pitchFamily="34" charset="0"/>
+                  <a:buChar char="•"/>
+                </a:pPr>
+                <a:r>
+                  <a:rPr lang="es-CL" dirty="0"/>
+                  <a:t> Queremos minimizar el costo total del viaje</a:t>
+                </a:r>
+              </a:p>
+              <a:p>
+                <a:pPr>
+                  <a:lnSpc>
+                    <a:spcPct val="120000"/>
+                  </a:lnSpc>
+                  <a:buFont typeface="Arial" panose="020B0604020202020204" pitchFamily="34" charset="0"/>
+                  <a:buChar char="•"/>
+                </a:pPr>
+                <a:r>
+                  <a:rPr lang="es-CL" dirty="0"/>
+                  <a:t> Si la página tarda en responder, el usuario buscará otra aerolínea</a:t>
+                </a:r>
+              </a:p>
+              <a:p>
+                <a:pPr marL="0" indent="0">
+                  <a:buNone/>
+                </a:pPr>
+                <a:endParaRPr lang="es-CL" dirty="0"/>
+              </a:p>
+              <a:p>
+                <a:pPr marL="0" indent="0">
+                  <a:buNone/>
+                </a:pPr>
+                <a:r>
+                  <a:rPr lang="es-CL" dirty="0"/>
+                  <a:t>¿Qué deberíamos hacer?</a:t>
+                </a:r>
+              </a:p>
+            </p:txBody>
+          </p:sp>
+        </mc:Choice>
+        <mc:Fallback xmlns="">
+          <p:sp>
+            <p:nvSpPr>
+              <p:cNvPr id="3" name="Content Placeholder 2">
+                <a:extLst>
+                  <a:ext uri="{FF2B5EF4-FFF2-40B4-BE49-F238E27FC236}">
+                    <a16:creationId xmlns:a16="http://schemas.microsoft.com/office/drawing/2014/main" id="{B4647918-AB7B-4CE6-8D12-CF80C0FB22FE}"/>
+                  </a:ext>
+                </a:extLst>
+              </p:cNvPr>
+              <p:cNvSpPr>
+                <a:spLocks noGrp="1" noRot="1" noChangeAspect="1" noMove="1" noResize="1" noEditPoints="1" noAdjustHandles="1" noChangeArrowheads="1" noChangeShapeType="1" noTextEdit="1"/>
+              </p:cNvSpPr>
+              <p:nvPr>
+                <p:ph idx="1"/>
+              </p:nvPr>
+            </p:nvSpPr>
+            <p:spPr>
+              <a:blipFill>
+                <a:blip r:embed="rId3"/>
+                <a:stretch>
+                  <a:fillRect l="-917" t="-856" b="-856"/>
+                </a:stretch>
+              </a:blipFill>
+            </p:spPr>
+            <p:txBody>
+              <a:bodyPr/>
+              <a:lstStyle/>
+              <a:p>
+                <a:r>
+                  <a:rPr lang="es-CL">
+                    <a:noFill/>
+                  </a:rPr>
+                  <a:t> </a:t>
+                </a:r>
+              </a:p>
+            </p:txBody>
+          </p:sp>
+        </mc:Fallback>
+      </mc:AlternateContent>
+    </p:spTree>
+    <p:extLst>
+      <p:ext uri="{BB962C8B-B14F-4D97-AF65-F5344CB8AC3E}">
+        <p14:creationId xmlns:p14="http://schemas.microsoft.com/office/powerpoint/2010/main" val="1997209740"/>
+      </p:ext>
+    </p:extLst>
+  </p:cSld>
+  <p:clrMapOvr>
+    <a:masterClrMapping/>
+  </p:clrMapOvr>
+</p:sld>
+</file>
+
+<file path=ppt/slides/slide20.xml><?xml version="1.0" encoding="utf-8"?>
 <p:sld xmlns:a="http://schemas.openxmlformats.org/drawingml/2006/main" xmlns:r="http://schemas.openxmlformats.org/officeDocument/2006/relationships" xmlns:p="http://schemas.openxmlformats.org/presentationml/2006/main">
   <p:cSld>
     <p:spTree>
@@ -14146,75 +14448,7 @@
 </p:sld>
 </file>
 
-<file path=ppt/slides/slide2.xml><?xml version="1.0" encoding="utf-8"?>
-<p:sld xmlns:a="http://schemas.openxmlformats.org/drawingml/2006/main" xmlns:r="http://schemas.openxmlformats.org/officeDocument/2006/relationships" xmlns:p="http://schemas.openxmlformats.org/presentationml/2006/main" showMasterSp="0">
-  <p:cSld>
-    <p:bg>
-      <p:bgPr>
-        <a:solidFill>
-          <a:srgbClr val="262626"/>
-        </a:solidFill>
-        <a:effectLst/>
-      </p:bgPr>
-    </p:bg>
-    <p:spTree>
-      <p:nvGrpSpPr>
-        <p:cNvPr id="1" name=""/>
-        <p:cNvGrpSpPr/>
-        <p:nvPr/>
-      </p:nvGrpSpPr>
-      <p:grpSpPr>
-        <a:xfrm>
-          <a:off x="0" y="0"/>
-          <a:ext cx="0" cy="0"/>
-          <a:chOff x="0" y="0"/>
-          <a:chExt cx="0" cy="0"/>
-        </a:xfrm>
-      </p:grpSpPr>
-      <p:pic>
-        <p:nvPicPr>
-          <p:cNvPr id="3" name="Picture 2">
-            <a:extLst>
-              <a:ext uri="{FF2B5EF4-FFF2-40B4-BE49-F238E27FC236}">
-                <a16:creationId xmlns:a16="http://schemas.microsoft.com/office/drawing/2014/main" id="{4A9B8A8F-A491-4D1E-8E7E-6A96B1989BD1}"/>
-              </a:ext>
-            </a:extLst>
-          </p:cNvPr>
-          <p:cNvPicPr>
-            <a:picLocks noChangeAspect="1"/>
-          </p:cNvPicPr>
-          <p:nvPr/>
-        </p:nvPicPr>
-        <p:blipFill>
-          <a:blip r:embed="rId3"/>
-          <a:stretch>
-            <a:fillRect/>
-          </a:stretch>
-        </p:blipFill>
-        <p:spPr>
-          <a:xfrm>
-            <a:off x="0" y="744564"/>
-            <a:ext cx="9144000" cy="5368872"/>
-          </a:xfrm>
-          <a:prstGeom prst="rect">
-            <a:avLst/>
-          </a:prstGeom>
-        </p:spPr>
-      </p:pic>
-    </p:spTree>
-    <p:extLst>
-      <p:ext uri="{BB962C8B-B14F-4D97-AF65-F5344CB8AC3E}">
-        <p14:creationId xmlns:p14="http://schemas.microsoft.com/office/powerpoint/2010/main" val="814741649"/>
-      </p:ext>
-    </p:extLst>
-  </p:cSld>
-  <p:clrMapOvr>
-    <a:masterClrMapping/>
-  </p:clrMapOvr>
-</p:sld>
-</file>
-
-<file path=ppt/slides/slide20.xml><?xml version="1.0" encoding="utf-8"?>
+<file path=ppt/slides/slide21.xml><?xml version="1.0" encoding="utf-8"?>
 <p:sld xmlns:a="http://schemas.openxmlformats.org/drawingml/2006/main" xmlns:r="http://schemas.openxmlformats.org/officeDocument/2006/relationships" xmlns:p="http://schemas.openxmlformats.org/presentationml/2006/main">
   <p:cSld>
     <p:spTree>
@@ -16541,7 +16775,7 @@
 </p:sld>
 </file>
 
-<file path=ppt/slides/slide21.xml><?xml version="1.0" encoding="utf-8"?>
+<file path=ppt/slides/slide22.xml><?xml version="1.0" encoding="utf-8"?>
 <p:sld xmlns:a="http://schemas.openxmlformats.org/drawingml/2006/main" xmlns:r="http://schemas.openxmlformats.org/officeDocument/2006/relationships" xmlns:p="http://schemas.openxmlformats.org/presentationml/2006/main">
   <p:cSld>
     <p:spTree>
@@ -18967,7 +19201,7 @@
 </p:sld>
 </file>
 
-<file path=ppt/slides/slide22.xml><?xml version="1.0" encoding="utf-8"?>
+<file path=ppt/slides/slide23.xml><?xml version="1.0" encoding="utf-8"?>
 <p:sld xmlns:a="http://schemas.openxmlformats.org/drawingml/2006/main" xmlns:r="http://schemas.openxmlformats.org/officeDocument/2006/relationships" xmlns:p="http://schemas.openxmlformats.org/presentationml/2006/main">
   <p:cSld>
     <p:spTree>
@@ -21354,7 +21588,7 @@
 </p:sld>
 </file>
 
-<file path=ppt/slides/slide23.xml><?xml version="1.0" encoding="utf-8"?>
+<file path=ppt/slides/slide24.xml><?xml version="1.0" encoding="utf-8"?>
 <p:sld xmlns:a="http://schemas.openxmlformats.org/drawingml/2006/main" xmlns:r="http://schemas.openxmlformats.org/officeDocument/2006/relationships" xmlns:p="http://schemas.openxmlformats.org/presentationml/2006/main">
   <p:cSld>
     <p:spTree>
@@ -23798,7 +24032,7 @@
 </p:sld>
 </file>
 
-<file path=ppt/slides/slide24.xml><?xml version="1.0" encoding="utf-8"?>
+<file path=ppt/slides/slide25.xml><?xml version="1.0" encoding="utf-8"?>
 <p:sld xmlns:a="http://schemas.openxmlformats.org/drawingml/2006/main" xmlns:r="http://schemas.openxmlformats.org/officeDocument/2006/relationships" xmlns:p="http://schemas.openxmlformats.org/presentationml/2006/main">
   <p:cSld>
     <p:spTree>
@@ -23910,7 +24144,7 @@
 </p:sld>
 </file>
 
-<file path=ppt/slides/slide25.xml><?xml version="1.0" encoding="utf-8"?>
+<file path=ppt/slides/slide26.xml><?xml version="1.0" encoding="utf-8"?>
 <p:sld xmlns:a="http://schemas.openxmlformats.org/drawingml/2006/main" xmlns:r="http://schemas.openxmlformats.org/officeDocument/2006/relationships" xmlns:p="http://schemas.openxmlformats.org/presentationml/2006/main">
   <p:cSld>
     <p:spTree>
@@ -23955,8 +24189,8 @@
           </a:p>
         </p:txBody>
       </p:sp>
-      <mc:AlternateContent xmlns:mc="http://schemas.openxmlformats.org/markup-compatibility/2006">
-        <mc:Choice xmlns:a14="http://schemas.microsoft.com/office/drawing/2010/main" Requires="a14">
+      <mc:AlternateContent xmlns:mc="http://schemas.openxmlformats.org/markup-compatibility/2006" xmlns:a14="http://schemas.microsoft.com/office/drawing/2010/main">
+        <mc:Choice Requires="a14">
           <p:sp>
             <p:nvSpPr>
               <p:cNvPr id="27" name="TextBox 26">
@@ -24419,7 +24653,7 @@
             </p:txBody>
           </p:sp>
         </mc:Choice>
-        <mc:Fallback>
+        <mc:Fallback xmlns="">
           <p:sp>
             <p:nvSpPr>
               <p:cNvPr id="27" name="TextBox 26">
@@ -24464,8 +24698,8 @@
           </p:sp>
         </mc:Fallback>
       </mc:AlternateContent>
-      <mc:AlternateContent xmlns:mc="http://schemas.openxmlformats.org/markup-compatibility/2006">
-        <mc:Choice xmlns:a14="http://schemas.microsoft.com/office/drawing/2010/main" Requires="a14">
+      <mc:AlternateContent xmlns:mc="http://schemas.openxmlformats.org/markup-compatibility/2006" xmlns:a14="http://schemas.microsoft.com/office/drawing/2010/main">
+        <mc:Choice Requires="a14">
           <p:sp>
             <p:nvSpPr>
               <p:cNvPr id="31" name="TextBox 30">
@@ -24820,7 +25054,7 @@
             </p:txBody>
           </p:sp>
         </mc:Choice>
-        <mc:Fallback>
+        <mc:Fallback xmlns="">
           <p:sp>
             <p:nvSpPr>
               <p:cNvPr id="31" name="TextBox 30">
@@ -24935,8 +25169,8 @@
           </a:p>
         </p:txBody>
       </p:sp>
-      <mc:AlternateContent xmlns:mc="http://schemas.openxmlformats.org/markup-compatibility/2006">
-        <mc:Choice xmlns:a14="http://schemas.microsoft.com/office/drawing/2010/main" Requires="a14">
+      <mc:AlternateContent xmlns:mc="http://schemas.openxmlformats.org/markup-compatibility/2006" xmlns:a14="http://schemas.microsoft.com/office/drawing/2010/main">
+        <mc:Choice Requires="a14">
           <p:sp>
             <p:nvSpPr>
               <p:cNvPr id="36" name="TextBox 35">
@@ -25291,7 +25525,7 @@
             </p:txBody>
           </p:sp>
         </mc:Choice>
-        <mc:Fallback>
+        <mc:Fallback xmlns="">
           <p:sp>
             <p:nvSpPr>
               <p:cNvPr id="36" name="TextBox 35">
@@ -25385,6 +25619,74 @@
 </file>
 
 <file path=ppt/slides/slide3.xml><?xml version="1.0" encoding="utf-8"?>
+<p:sld xmlns:a="http://schemas.openxmlformats.org/drawingml/2006/main" xmlns:r="http://schemas.openxmlformats.org/officeDocument/2006/relationships" xmlns:p="http://schemas.openxmlformats.org/presentationml/2006/main" showMasterSp="0">
+  <p:cSld>
+    <p:bg>
+      <p:bgPr>
+        <a:solidFill>
+          <a:srgbClr val="262626"/>
+        </a:solidFill>
+        <a:effectLst/>
+      </p:bgPr>
+    </p:bg>
+    <p:spTree>
+      <p:nvGrpSpPr>
+        <p:cNvPr id="1" name=""/>
+        <p:cNvGrpSpPr/>
+        <p:nvPr/>
+      </p:nvGrpSpPr>
+      <p:grpSpPr>
+        <a:xfrm>
+          <a:off x="0" y="0"/>
+          <a:ext cx="0" cy="0"/>
+          <a:chOff x="0" y="0"/>
+          <a:chExt cx="0" cy="0"/>
+        </a:xfrm>
+      </p:grpSpPr>
+      <p:pic>
+        <p:nvPicPr>
+          <p:cNvPr id="3" name="Picture 2">
+            <a:extLst>
+              <a:ext uri="{FF2B5EF4-FFF2-40B4-BE49-F238E27FC236}">
+                <a16:creationId xmlns:a16="http://schemas.microsoft.com/office/drawing/2014/main" id="{4A9B8A8F-A491-4D1E-8E7E-6A96B1989BD1}"/>
+              </a:ext>
+            </a:extLst>
+          </p:cNvPr>
+          <p:cNvPicPr>
+            <a:picLocks noChangeAspect="1"/>
+          </p:cNvPicPr>
+          <p:nvPr/>
+        </p:nvPicPr>
+        <p:blipFill>
+          <a:blip r:embed="rId3"/>
+          <a:stretch>
+            <a:fillRect/>
+          </a:stretch>
+        </p:blipFill>
+        <p:spPr>
+          <a:xfrm>
+            <a:off x="0" y="744564"/>
+            <a:ext cx="9144000" cy="5368872"/>
+          </a:xfrm>
+          <a:prstGeom prst="rect">
+            <a:avLst/>
+          </a:prstGeom>
+        </p:spPr>
+      </p:pic>
+    </p:spTree>
+    <p:extLst>
+      <p:ext uri="{BB962C8B-B14F-4D97-AF65-F5344CB8AC3E}">
+        <p14:creationId xmlns:p14="http://schemas.microsoft.com/office/powerpoint/2010/main" val="814741649"/>
+      </p:ext>
+    </p:extLst>
+  </p:cSld>
+  <p:clrMapOvr>
+    <a:masterClrMapping/>
+  </p:clrMapOvr>
+</p:sld>
+</file>
+
+<file path=ppt/slides/slide4.xml><?xml version="1.0" encoding="utf-8"?>
 <p:sld xmlns:a="http://schemas.openxmlformats.org/drawingml/2006/main" xmlns:r="http://schemas.openxmlformats.org/officeDocument/2006/relationships" xmlns:p="http://schemas.openxmlformats.org/presentationml/2006/main">
   <p:cSld>
     <p:spTree>
@@ -25489,7 +25791,7 @@
 </p:sld>
 </file>
 
-<file path=ppt/slides/slide4.xml><?xml version="1.0" encoding="utf-8"?>
+<file path=ppt/slides/slide5.xml><?xml version="1.0" encoding="utf-8"?>
 <p:sld xmlns:a="http://schemas.openxmlformats.org/drawingml/2006/main" xmlns:r="http://schemas.openxmlformats.org/officeDocument/2006/relationships" xmlns:p="http://schemas.openxmlformats.org/presentationml/2006/main">
   <p:cSld>
     <p:spTree>
@@ -25593,7 +25895,7 @@
 </p:sld>
 </file>
 
-<file path=ppt/slides/slide5.xml><?xml version="1.0" encoding="utf-8"?>
+<file path=ppt/slides/slide6.xml><?xml version="1.0" encoding="utf-8"?>
 <p:sld xmlns:a="http://schemas.openxmlformats.org/drawingml/2006/main" xmlns:r="http://schemas.openxmlformats.org/officeDocument/2006/relationships" xmlns:p="http://schemas.openxmlformats.org/presentationml/2006/main">
   <p:cSld>
     <p:spTree>
@@ -25652,7 +25954,7 @@
 </p:sld>
 </file>
 
-<file path=ppt/slides/slide6.xml><?xml version="1.0" encoding="utf-8"?>
+<file path=ppt/slides/slide7.xml><?xml version="1.0" encoding="utf-8"?>
 <p:sld xmlns:a="http://schemas.openxmlformats.org/drawingml/2006/main" xmlns:r="http://schemas.openxmlformats.org/officeDocument/2006/relationships" xmlns:p="http://schemas.openxmlformats.org/presentationml/2006/main">
   <p:cSld>
     <p:spTree>
@@ -25778,7 +26080,7 @@
 </p:sld>
 </file>
 
-<file path=ppt/slides/slide7.xml><?xml version="1.0" encoding="utf-8"?>
+<file path=ppt/slides/slide8.xml><?xml version="1.0" encoding="utf-8"?>
 <p:sld xmlns:a="http://schemas.openxmlformats.org/drawingml/2006/main" xmlns:r="http://schemas.openxmlformats.org/officeDocument/2006/relationships" xmlns:p="http://schemas.openxmlformats.org/presentationml/2006/main">
   <p:cSld>
     <p:spTree>
@@ -25873,7 +26175,7 @@
 </p:sld>
 </file>
 
-<file path=ppt/slides/slide8.xml><?xml version="1.0" encoding="utf-8"?>
+<file path=ppt/slides/slide9.xml><?xml version="1.0" encoding="utf-8"?>
 <p:sld xmlns:a="http://schemas.openxmlformats.org/drawingml/2006/main" xmlns:r="http://schemas.openxmlformats.org/officeDocument/2006/relationships" xmlns:p="http://schemas.openxmlformats.org/presentationml/2006/main">
   <p:cSld>
     <p:spTree>
@@ -25920,8 +26222,8 @@
           </a:p>
         </p:txBody>
       </p:sp>
-      <mc:AlternateContent xmlns:mc="http://schemas.openxmlformats.org/markup-compatibility/2006">
-        <mc:Choice xmlns:a14="http://schemas.microsoft.com/office/drawing/2010/main" Requires="a14">
+      <mc:AlternateContent xmlns:mc="http://schemas.openxmlformats.org/markup-compatibility/2006" xmlns:a14="http://schemas.microsoft.com/office/drawing/2010/main">
+        <mc:Choice Requires="a14">
           <p:sp>
             <p:nvSpPr>
               <p:cNvPr id="3" name="Content Placeholder 2">
@@ -26101,7 +26403,7 @@
             </p:txBody>
           </p:sp>
         </mc:Choice>
-        <mc:Fallback>
+        <mc:Fallback xmlns="">
           <p:sp>
             <p:nvSpPr>
               <p:cNvPr id="3" name="Content Placeholder 2">
@@ -26145,208 +26447,6 @@
     <p:extLst>
       <p:ext uri="{BB962C8B-B14F-4D97-AF65-F5344CB8AC3E}">
         <p14:creationId xmlns:p14="http://schemas.microsoft.com/office/powerpoint/2010/main" val="3340872616"/>
-      </p:ext>
-    </p:extLst>
-  </p:cSld>
-  <p:clrMapOvr>
-    <a:masterClrMapping/>
-  </p:clrMapOvr>
-</p:sld>
-</file>
-
-<file path=ppt/slides/slide9.xml><?xml version="1.0" encoding="utf-8"?>
-<p:sld xmlns:a="http://schemas.openxmlformats.org/drawingml/2006/main" xmlns:r="http://schemas.openxmlformats.org/officeDocument/2006/relationships" xmlns:p="http://schemas.openxmlformats.org/presentationml/2006/main">
-  <p:cSld>
-    <p:spTree>
-      <p:nvGrpSpPr>
-        <p:cNvPr id="1" name=""/>
-        <p:cNvGrpSpPr/>
-        <p:nvPr/>
-      </p:nvGrpSpPr>
-      <p:grpSpPr>
-        <a:xfrm>
-          <a:off x="0" y="0"/>
-          <a:ext cx="0" cy="0"/>
-          <a:chOff x="0" y="0"/>
-          <a:chExt cx="0" cy="0"/>
-        </a:xfrm>
-      </p:grpSpPr>
-      <p:sp>
-        <p:nvSpPr>
-          <p:cNvPr id="4" name="Title 3">
-            <a:extLst>
-              <a:ext uri="{FF2B5EF4-FFF2-40B4-BE49-F238E27FC236}">
-                <a16:creationId xmlns:a16="http://schemas.microsoft.com/office/drawing/2014/main" id="{31DFC968-27E4-4A44-99D9-B7F0DED4A384}"/>
-              </a:ext>
-            </a:extLst>
-          </p:cNvPr>
-          <p:cNvSpPr>
-            <a:spLocks noGrp="1"/>
-          </p:cNvSpPr>
-          <p:nvPr>
-            <p:ph type="title"/>
-          </p:nvPr>
-        </p:nvSpPr>
-        <p:spPr/>
-        <p:txBody>
-          <a:bodyPr/>
-          <a:lstStyle/>
-          <a:p>
-            <a:r>
-              <a:rPr lang="es-CL" dirty="0"/>
-              <a:t>Combinaciones de input</a:t>
-            </a:r>
-          </a:p>
-        </p:txBody>
-      </p:sp>
-      <mc:AlternateContent xmlns:mc="http://schemas.openxmlformats.org/markup-compatibility/2006" xmlns:a14="http://schemas.microsoft.com/office/drawing/2010/main">
-        <mc:Choice Requires="a14">
-          <p:sp>
-            <p:nvSpPr>
-              <p:cNvPr id="3" name="Content Placeholder 2">
-                <a:extLst>
-                  <a:ext uri="{FF2B5EF4-FFF2-40B4-BE49-F238E27FC236}">
-                    <a16:creationId xmlns:a16="http://schemas.microsoft.com/office/drawing/2014/main" id="{AA36ED36-EA70-40CE-B266-1CBAB93389D9}"/>
-                  </a:ext>
-                </a:extLst>
-              </p:cNvPr>
-              <p:cNvSpPr>
-                <a:spLocks noGrp="1"/>
-              </p:cNvSpPr>
-              <p:nvPr>
-                <p:ph idx="1"/>
-              </p:nvPr>
-            </p:nvSpPr>
-            <p:spPr/>
-            <p:txBody>
-              <a:bodyPr anchor="ctr">
-                <a:normAutofit/>
-              </a:bodyPr>
-              <a:lstStyle/>
-              <a:p>
-                <a:pPr marL="0" indent="0">
-                  <a:buNone/>
-                </a:pPr>
-                <a:r>
-                  <a:rPr lang="es-CL" sz="2600" dirty="0"/>
-                  <a:t>¿Cuántas posibles combinaciones </a:t>
-                </a:r>
-                <a14:m>
-                  <m:oMath xmlns:m="http://schemas.openxmlformats.org/officeDocument/2006/math">
-                    <m:r>
-                      <a:rPr lang="es-CL" sz="2600" b="0" i="1" smtClean="0">
-                        <a:latin typeface="Cambria Math" panose="02040503050406030204" pitchFamily="18" charset="0"/>
-                      </a:rPr>
-                      <m:t>𝑢</m:t>
-                    </m:r>
-                    <m:r>
-                      <a:rPr lang="es-CL" sz="2600" b="0" i="1" smtClean="0">
-                        <a:latin typeface="Cambria Math" panose="02040503050406030204" pitchFamily="18" charset="0"/>
-                      </a:rPr>
-                      <m:t>,</m:t>
-                    </m:r>
-                    <m:r>
-                      <a:rPr lang="es-CL" sz="2600" b="0" i="1" smtClean="0">
-                        <a:latin typeface="Cambria Math" panose="02040503050406030204" pitchFamily="18" charset="0"/>
-                      </a:rPr>
-                      <m:t>𝑣</m:t>
-                    </m:r>
-                    <m:r>
-                      <a:rPr lang="es-CL" sz="2600" b="0" i="1" smtClean="0">
-                        <a:latin typeface="Cambria Math" panose="02040503050406030204" pitchFamily="18" charset="0"/>
-                      </a:rPr>
-                      <m:t>,</m:t>
-                    </m:r>
-                    <m:r>
-                      <a:rPr lang="es-CL" sz="2600" b="0" i="1" smtClean="0">
-                        <a:latin typeface="Cambria Math" panose="02040503050406030204" pitchFamily="18" charset="0"/>
-                      </a:rPr>
-                      <m:t>𝑋</m:t>
-                    </m:r>
-                  </m:oMath>
-                </a14:m>
-                <a:r>
-                  <a:rPr lang="es-CL" sz="2600" dirty="0"/>
-                  <a:t> existen?</a:t>
-                </a:r>
-              </a:p>
-              <a:p>
-                <a:pPr marL="0" indent="0">
-                  <a:buNone/>
-                </a:pPr>
-                <a:endParaRPr lang="es-CL" sz="2600" dirty="0"/>
-              </a:p>
-              <a:p>
-                <a:pPr marL="0" indent="0">
-                  <a:buNone/>
-                </a:pPr>
-                <a:r>
-                  <a:rPr lang="es-CL" sz="2600" dirty="0"/>
-                  <a:t>¿Tiene sentido generarlas todas?</a:t>
-                </a:r>
-              </a:p>
-              <a:p>
-                <a:pPr marL="0" indent="0">
-                  <a:buNone/>
-                </a:pPr>
-                <a:endParaRPr lang="es-CL" sz="2600" dirty="0"/>
-              </a:p>
-              <a:p>
-                <a:pPr marL="0" indent="0">
-                  <a:buNone/>
-                </a:pPr>
-                <a:r>
-                  <a:rPr lang="es-CL" sz="2600" dirty="0"/>
-                  <a:t>¿Qué podemos hacer para acotar las que puede ver la función?</a:t>
-                </a:r>
-              </a:p>
-            </p:txBody>
-          </p:sp>
-        </mc:Choice>
-        <mc:Fallback xmlns="">
-          <p:sp>
-            <p:nvSpPr>
-              <p:cNvPr id="3" name="Content Placeholder 2">
-                <a:extLst>
-                  <a:ext uri="{FF2B5EF4-FFF2-40B4-BE49-F238E27FC236}">
-                    <a16:creationId xmlns:a16="http://schemas.microsoft.com/office/drawing/2014/main" id="{AA36ED36-EA70-40CE-B266-1CBAB93389D9}"/>
-                  </a:ext>
-                </a:extLst>
-              </p:cNvPr>
-              <p:cNvSpPr>
-                <a:spLocks noGrp="1" noRot="1" noChangeAspect="1" noMove="1" noResize="1" noEditPoints="1" noAdjustHandles="1" noChangeArrowheads="1" noChangeShapeType="1" noTextEdit="1"/>
-              </p:cNvSpPr>
-              <p:nvPr>
-                <p:ph idx="1"/>
-              </p:nvPr>
-            </p:nvSpPr>
-            <p:spPr>
-              <a:blipFill>
-                <a:blip r:embed="rId3"/>
-                <a:stretch>
-                  <a:fillRect l="-1269" r="-987"/>
-                </a:stretch>
-              </a:blipFill>
-            </p:spPr>
-            <p:txBody>
-              <a:bodyPr/>
-              <a:lstStyle/>
-              <a:p>
-                <a:r>
-                  <a:rPr lang="es-CL">
-                    <a:noFill/>
-                  </a:rPr>
-                  <a:t> </a:t>
-                </a:r>
-              </a:p>
-            </p:txBody>
-          </p:sp>
-        </mc:Fallback>
-      </mc:AlternateContent>
-    </p:spTree>
-    <p:extLst>
-      <p:ext uri="{BB962C8B-B14F-4D97-AF65-F5344CB8AC3E}">
-        <p14:creationId xmlns:p14="http://schemas.microsoft.com/office/powerpoint/2010/main" val="685510549"/>
       </p:ext>
     </p:extLst>
   </p:cSld>

</xml_diff>